<commit_message>
Swamy/05feb work for 12feb session (#23)
* Documentation

* Documentation

* Update MinimalAPI-Series.MD

* Documentation

* Session 2

* Documentation

* Documentation Updates

* Initial version

* Documentation Updates

* Images

* Documentation

* Documentation

* Initial Version

* Create Microservices-Series.MD

* Documentation

* Changes

* Verified the Static Web Site

* .NET 7 Minimal API

* Static Web Site on AWS

* Minimal API in AWS

* Changes

* Update README.md
</commit_message>
<xml_diff>
--- a/TechTalk.pptx
+++ b/TechTalk.pptx
@@ -246,7 +246,7 @@
           <a:p>
             <a:fld id="{289D7669-2C4F-4057-B198-13E596C98571}" type="datetimeFigureOut">
               <a:rPr lang="en-IN" smtClean="0"/>
-              <a:t>10-02-2023</a:t>
+              <a:t>11-02-2023</a:t>
             </a:fld>
             <a:endParaRPr lang="en-IN"/>
           </a:p>
@@ -663,7 +663,7 @@
           <a:p>
             <a:fld id="{AAAFDAC1-E73E-4D41-B9D9-D9AB5226AECC}" type="datetimeFigureOut">
               <a:rPr lang="en-IN" smtClean="0"/>
-              <a:t>10-02-2023</a:t>
+              <a:t>11-02-2023</a:t>
             </a:fld>
             <a:endParaRPr lang="en-IN"/>
           </a:p>
@@ -863,7 +863,7 @@
           <a:p>
             <a:fld id="{AAAFDAC1-E73E-4D41-B9D9-D9AB5226AECC}" type="datetimeFigureOut">
               <a:rPr lang="en-IN" smtClean="0"/>
-              <a:t>10-02-2023</a:t>
+              <a:t>11-02-2023</a:t>
             </a:fld>
             <a:endParaRPr lang="en-IN"/>
           </a:p>
@@ -1073,7 +1073,7 @@
           <a:p>
             <a:fld id="{AAAFDAC1-E73E-4D41-B9D9-D9AB5226AECC}" type="datetimeFigureOut">
               <a:rPr lang="en-IN" smtClean="0"/>
-              <a:t>10-02-2023</a:t>
+              <a:t>11-02-2023</a:t>
             </a:fld>
             <a:endParaRPr lang="en-IN"/>
           </a:p>
@@ -1293,7 +1293,7 @@
           <a:p>
             <a:fld id="{5C55C9EC-A943-4027-9290-5A7F0DEB51E2}" type="datetimeFigureOut">
               <a:rPr lang="en-US" smtClean="0"/>
-              <a:t>2/10/2023</a:t>
+              <a:t>2/11/2023</a:t>
             </a:fld>
             <a:endParaRPr lang="en-US"/>
           </a:p>
@@ -1491,7 +1491,7 @@
           <a:p>
             <a:fld id="{5C55C9EC-A943-4027-9290-5A7F0DEB51E2}" type="datetimeFigureOut">
               <a:rPr lang="en-US" smtClean="0"/>
-              <a:t>2/10/2023</a:t>
+              <a:t>2/11/2023</a:t>
             </a:fld>
             <a:endParaRPr lang="en-US"/>
           </a:p>
@@ -1766,7 +1766,7 @@
           <a:p>
             <a:fld id="{5C55C9EC-A943-4027-9290-5A7F0DEB51E2}" type="datetimeFigureOut">
               <a:rPr lang="en-US" smtClean="0"/>
-              <a:t>2/10/2023</a:t>
+              <a:t>2/11/2023</a:t>
             </a:fld>
             <a:endParaRPr lang="en-US"/>
           </a:p>
@@ -2031,7 +2031,7 @@
           <a:p>
             <a:fld id="{5C55C9EC-A943-4027-9290-5A7F0DEB51E2}" type="datetimeFigureOut">
               <a:rPr lang="en-US" smtClean="0"/>
-              <a:t>2/10/2023</a:t>
+              <a:t>2/11/2023</a:t>
             </a:fld>
             <a:endParaRPr lang="en-US"/>
           </a:p>
@@ -2443,7 +2443,7 @@
           <a:p>
             <a:fld id="{5C55C9EC-A943-4027-9290-5A7F0DEB51E2}" type="datetimeFigureOut">
               <a:rPr lang="en-US" smtClean="0"/>
-              <a:t>2/10/2023</a:t>
+              <a:t>2/11/2023</a:t>
             </a:fld>
             <a:endParaRPr lang="en-US"/>
           </a:p>
@@ -2584,7 +2584,7 @@
           <a:p>
             <a:fld id="{5C55C9EC-A943-4027-9290-5A7F0DEB51E2}" type="datetimeFigureOut">
               <a:rPr lang="en-US" smtClean="0"/>
-              <a:t>2/10/2023</a:t>
+              <a:t>2/11/2023</a:t>
             </a:fld>
             <a:endParaRPr lang="en-US"/>
           </a:p>
@@ -2697,7 +2697,7 @@
           <a:p>
             <a:fld id="{5C55C9EC-A943-4027-9290-5A7F0DEB51E2}" type="datetimeFigureOut">
               <a:rPr lang="en-US" smtClean="0"/>
-              <a:t>2/10/2023</a:t>
+              <a:t>2/11/2023</a:t>
             </a:fld>
             <a:endParaRPr lang="en-US"/>
           </a:p>
@@ -3008,7 +3008,7 @@
           <a:p>
             <a:fld id="{5C55C9EC-A943-4027-9290-5A7F0DEB51E2}" type="datetimeFigureOut">
               <a:rPr lang="en-US" smtClean="0"/>
-              <a:t>2/10/2023</a:t>
+              <a:t>2/11/2023</a:t>
             </a:fld>
             <a:endParaRPr lang="en-US"/>
           </a:p>
@@ -3208,7 +3208,7 @@
           <a:p>
             <a:fld id="{AAAFDAC1-E73E-4D41-B9D9-D9AB5226AECC}" type="datetimeFigureOut">
               <a:rPr lang="en-IN" smtClean="0"/>
-              <a:t>10-02-2023</a:t>
+              <a:t>11-02-2023</a:t>
             </a:fld>
             <a:endParaRPr lang="en-IN"/>
           </a:p>
@@ -3496,7 +3496,7 @@
           <a:p>
             <a:fld id="{5C55C9EC-A943-4027-9290-5A7F0DEB51E2}" type="datetimeFigureOut">
               <a:rPr lang="en-US" smtClean="0"/>
-              <a:t>2/10/2023</a:t>
+              <a:t>2/11/2023</a:t>
             </a:fld>
             <a:endParaRPr lang="en-US"/>
           </a:p>
@@ -3694,7 +3694,7 @@
           <a:p>
             <a:fld id="{5C55C9EC-A943-4027-9290-5A7F0DEB51E2}" type="datetimeFigureOut">
               <a:rPr lang="en-US" smtClean="0"/>
-              <a:t>2/10/2023</a:t>
+              <a:t>2/11/2023</a:t>
             </a:fld>
             <a:endParaRPr lang="en-US"/>
           </a:p>
@@ -3902,7 +3902,7 @@
           <a:p>
             <a:fld id="{5C55C9EC-A943-4027-9290-5A7F0DEB51E2}" type="datetimeFigureOut">
               <a:rPr lang="en-US" smtClean="0"/>
-              <a:t>2/10/2023</a:t>
+              <a:t>2/11/2023</a:t>
             </a:fld>
             <a:endParaRPr lang="en-US"/>
           </a:p>
@@ -4106,7 +4106,7 @@
           <a:p>
             <a:fld id="{A3D997B0-F87C-48C5-82AE-40756E436AED}" type="datetime1">
               <a:rPr lang="en-US" smtClean="0"/>
-              <a:t>2/10/2023</a:t>
+              <a:t>2/11/2023</a:t>
             </a:fld>
             <a:endParaRPr lang="en-US"/>
           </a:p>
@@ -4279,7 +4279,7 @@
           <a:p>
             <a:fld id="{701D4B01-752C-4C35-AEA2-5921A689F5A7}" type="datetime1">
               <a:rPr lang="en-US" smtClean="0"/>
-              <a:t>2/10/2023</a:t>
+              <a:t>2/11/2023</a:t>
             </a:fld>
             <a:endParaRPr lang="en-US"/>
           </a:p>
@@ -4528,7 +4528,7 @@
           <a:p>
             <a:fld id="{DE74A512-7248-406B-86BF-E296AD55CF49}" type="datetime1">
               <a:rPr lang="en-US" smtClean="0"/>
-              <a:t>2/10/2023</a:t>
+              <a:t>2/11/2023</a:t>
             </a:fld>
             <a:endParaRPr lang="en-US"/>
           </a:p>
@@ -4763,7 +4763,7 @@
           <a:p>
             <a:fld id="{78C537D5-E3DE-4105-B0AC-38A21365C197}" type="datetime1">
               <a:rPr lang="en-US" smtClean="0"/>
-              <a:t>2/10/2023</a:t>
+              <a:t>2/11/2023</a:t>
             </a:fld>
             <a:endParaRPr lang="en-US"/>
           </a:p>
@@ -5133,7 +5133,7 @@
           <a:p>
             <a:fld id="{B8BD058F-09DF-4993-AE53-E92A7689CEAD}" type="datetime1">
               <a:rPr lang="en-US" smtClean="0"/>
-              <a:t>2/10/2023</a:t>
+              <a:t>2/11/2023</a:t>
             </a:fld>
             <a:endParaRPr lang="en-US"/>
           </a:p>
@@ -5254,7 +5254,7 @@
           <a:p>
             <a:fld id="{E19471B3-D8DD-4988-8C26-A807F755DEAD}" type="datetime1">
               <a:rPr lang="en-US" smtClean="0"/>
-              <a:t>2/10/2023</a:t>
+              <a:t>2/11/2023</a:t>
             </a:fld>
             <a:endParaRPr lang="en-US"/>
           </a:p>
@@ -5352,7 +5352,7 @@
           <a:p>
             <a:fld id="{738378E2-22D8-4882-8104-F807B0E62B4E}" type="datetime1">
               <a:rPr lang="en-US" smtClean="0"/>
-              <a:t>2/10/2023</a:t>
+              <a:t>2/11/2023</a:t>
             </a:fld>
             <a:endParaRPr lang="en-US"/>
           </a:p>
@@ -5619,7 +5619,7 @@
           <a:p>
             <a:fld id="{AAAFDAC1-E73E-4D41-B9D9-D9AB5226AECC}" type="datetimeFigureOut">
               <a:rPr lang="en-IN" smtClean="0"/>
-              <a:t>10-02-2023</a:t>
+              <a:t>11-02-2023</a:t>
             </a:fld>
             <a:endParaRPr lang="en-IN"/>
           </a:p>
@@ -5908,7 +5908,7 @@
           <a:p>
             <a:fld id="{A5BAD5AE-3C5E-4251-B769-B6224CE8598B}" type="datetime1">
               <a:rPr lang="en-US" smtClean="0"/>
-              <a:t>2/10/2023</a:t>
+              <a:t>2/11/2023</a:t>
             </a:fld>
             <a:endParaRPr lang="en-US"/>
           </a:p>
@@ -6168,7 +6168,7 @@
           <a:p>
             <a:fld id="{EE312CFE-F8CF-4D2A-A9FF-4F2C30305432}" type="datetime1">
               <a:rPr lang="en-US" smtClean="0"/>
-              <a:t>2/10/2023</a:t>
+              <a:t>2/11/2023</a:t>
             </a:fld>
             <a:endParaRPr lang="en-US"/>
           </a:p>
@@ -6341,7 +6341,7 @@
           <a:p>
             <a:fld id="{C4466C03-75DE-431E-8229-7D31A04DF7BD}" type="datetime1">
               <a:rPr lang="en-US" smtClean="0"/>
-              <a:t>2/10/2023</a:t>
+              <a:t>2/11/2023</a:t>
             </a:fld>
             <a:endParaRPr lang="en-US"/>
           </a:p>
@@ -6524,7 +6524,7 @@
           <a:p>
             <a:fld id="{0D79318F-E85C-4A65-9BDD-82F2415695D3}" type="datetime1">
               <a:rPr lang="en-US" smtClean="0"/>
-              <a:t>2/10/2023</a:t>
+              <a:t>2/11/2023</a:t>
             </a:fld>
             <a:endParaRPr lang="en-US"/>
           </a:p>
@@ -6783,7 +6783,7 @@
           <a:p>
             <a:fld id="{AAAFDAC1-E73E-4D41-B9D9-D9AB5226AECC}" type="datetimeFigureOut">
               <a:rPr lang="en-IN" smtClean="0"/>
-              <a:t>10-02-2023</a:t>
+              <a:t>11-02-2023</a:t>
             </a:fld>
             <a:endParaRPr lang="en-IN"/>
           </a:p>
@@ -7198,7 +7198,7 @@
           <a:p>
             <a:fld id="{AAAFDAC1-E73E-4D41-B9D9-D9AB5226AECC}" type="datetimeFigureOut">
               <a:rPr lang="en-IN" smtClean="0"/>
-              <a:t>10-02-2023</a:t>
+              <a:t>11-02-2023</a:t>
             </a:fld>
             <a:endParaRPr lang="en-IN"/>
           </a:p>
@@ -7340,7 +7340,7 @@
           <a:p>
             <a:fld id="{AAAFDAC1-E73E-4D41-B9D9-D9AB5226AECC}" type="datetimeFigureOut">
               <a:rPr lang="en-IN" smtClean="0"/>
-              <a:t>10-02-2023</a:t>
+              <a:t>11-02-2023</a:t>
             </a:fld>
             <a:endParaRPr lang="en-IN"/>
           </a:p>
@@ -7453,7 +7453,7 @@
           <a:p>
             <a:fld id="{AAAFDAC1-E73E-4D41-B9D9-D9AB5226AECC}" type="datetimeFigureOut">
               <a:rPr lang="en-IN" smtClean="0"/>
-              <a:t>10-02-2023</a:t>
+              <a:t>11-02-2023</a:t>
             </a:fld>
             <a:endParaRPr lang="en-IN"/>
           </a:p>
@@ -7766,7 +7766,7 @@
           <a:p>
             <a:fld id="{AAAFDAC1-E73E-4D41-B9D9-D9AB5226AECC}" type="datetimeFigureOut">
               <a:rPr lang="en-IN" smtClean="0"/>
-              <a:t>10-02-2023</a:t>
+              <a:t>11-02-2023</a:t>
             </a:fld>
             <a:endParaRPr lang="en-IN"/>
           </a:p>
@@ -8055,7 +8055,7 @@
           <a:p>
             <a:fld id="{AAAFDAC1-E73E-4D41-B9D9-D9AB5226AECC}" type="datetimeFigureOut">
               <a:rPr lang="en-IN" smtClean="0"/>
-              <a:t>10-02-2023</a:t>
+              <a:t>11-02-2023</a:t>
             </a:fld>
             <a:endParaRPr lang="en-IN"/>
           </a:p>
@@ -8298,7 +8298,7 @@
           <a:p>
             <a:fld id="{AAAFDAC1-E73E-4D41-B9D9-D9AB5226AECC}" type="datetimeFigureOut">
               <a:rPr lang="en-IN" smtClean="0"/>
-              <a:t>10-02-2023</a:t>
+              <a:t>11-02-2023</a:t>
             </a:fld>
             <a:endParaRPr lang="en-IN"/>
           </a:p>
@@ -8866,7 +8866,7 @@
           <a:p>
             <a:fld id="{5C55C9EC-A943-4027-9290-5A7F0DEB51E2}" type="datetimeFigureOut">
               <a:rPr lang="en-US" smtClean="0"/>
-              <a:t>2/10/2023</a:t>
+              <a:t>2/11/2023</a:t>
             </a:fld>
             <a:endParaRPr lang="en-US"/>
           </a:p>
@@ -9418,7 +9418,7 @@
           <a:p>
             <a:fld id="{3EC3C3A3-B174-4863-A76B-003903AD383A}" type="datetime1">
               <a:rPr lang="en-US" smtClean="0"/>
-              <a:t>2/10/2023</a:t>
+              <a:t>2/11/2023</a:t>
             </a:fld>
             <a:endParaRPr lang="en-US"/>
           </a:p>
@@ -31330,7 +31330,7 @@
       </p:grpSpPr>
       <p:sp>
         <p:nvSpPr>
-          <p:cNvPr id="10" name="Rectangle 9">
+          <p:cNvPr id="29" name="Rectangle 14">
             <a:extLst>
               <a:ext uri="{FF2B5EF4-FFF2-40B4-BE49-F238E27FC236}">
                 <a16:creationId xmlns:a16="http://schemas.microsoft.com/office/drawing/2014/main" id="{42A4FC2C-047E-45A5-965D-8E1E3BF09BC6}"/>
@@ -31485,10 +31485,10 @@
       </p:sp>
       <p:pic>
         <p:nvPicPr>
-          <p:cNvPr id="5" name="Picture 4" descr="Graphical user interface&#10;&#10;Description automatically generated">
-            <a:extLst>
-              <a:ext uri="{FF2B5EF4-FFF2-40B4-BE49-F238E27FC236}">
-                <a16:creationId xmlns:a16="http://schemas.microsoft.com/office/drawing/2014/main" id="{ED9FE089-1300-5982-A87A-3E7B116C558B}"/>
+          <p:cNvPr id="4" name="Picture 3" descr="Graphical user interface, text, application, email&#10;&#10;Description automatically generated">
+            <a:extLst>
+              <a:ext uri="{FF2B5EF4-FFF2-40B4-BE49-F238E27FC236}">
+                <a16:creationId xmlns:a16="http://schemas.microsoft.com/office/drawing/2014/main" id="{50DF4389-27E7-62B1-B90F-BF446031FE91}"/>
               </a:ext>
             </a:extLst>
           </p:cNvPr>
@@ -31498,8 +31498,14 @@
           <p:nvPr/>
         </p:nvPicPr>
         <p:blipFill rotWithShape="1">
-          <a:blip r:embed="rId2"/>
-          <a:srcRect l="1458" r="6080"/>
+          <a:blip r:embed="rId2">
+            <a:extLst>
+              <a:ext uri="{28A0092B-C50C-407E-A947-70E740481C1C}">
+                <a14:useLocalDpi xmlns:a14="http://schemas.microsoft.com/office/drawing/2010/main" val="0"/>
+              </a:ext>
+            </a:extLst>
+          </a:blip>
+          <a:srcRect l="5317" r="2221"/>
           <a:stretch/>
         </p:blipFill>
         <p:spPr>

</xml_diff>

<commit_message>
Swamy/13feb for 19feb session (#25)
* Documentation Updates

* Update README.md

* Update README.md
</commit_message>
<xml_diff>
--- a/TechTalk.pptx
+++ b/TechTalk.pptx
@@ -246,7 +246,7 @@
           <a:p>
             <a:fld id="{289D7669-2C4F-4057-B198-13E596C98571}" type="datetimeFigureOut">
               <a:rPr lang="en-IN" smtClean="0"/>
-              <a:t>11-02-2023</a:t>
+              <a:t>13-02-2023</a:t>
             </a:fld>
             <a:endParaRPr lang="en-IN"/>
           </a:p>
@@ -663,7 +663,7 @@
           <a:p>
             <a:fld id="{AAAFDAC1-E73E-4D41-B9D9-D9AB5226AECC}" type="datetimeFigureOut">
               <a:rPr lang="en-IN" smtClean="0"/>
-              <a:t>11-02-2023</a:t>
+              <a:t>13-02-2023</a:t>
             </a:fld>
             <a:endParaRPr lang="en-IN"/>
           </a:p>
@@ -863,7 +863,7 @@
           <a:p>
             <a:fld id="{AAAFDAC1-E73E-4D41-B9D9-D9AB5226AECC}" type="datetimeFigureOut">
               <a:rPr lang="en-IN" smtClean="0"/>
-              <a:t>11-02-2023</a:t>
+              <a:t>13-02-2023</a:t>
             </a:fld>
             <a:endParaRPr lang="en-IN"/>
           </a:p>
@@ -1073,7 +1073,7 @@
           <a:p>
             <a:fld id="{AAAFDAC1-E73E-4D41-B9D9-D9AB5226AECC}" type="datetimeFigureOut">
               <a:rPr lang="en-IN" smtClean="0"/>
-              <a:t>11-02-2023</a:t>
+              <a:t>13-02-2023</a:t>
             </a:fld>
             <a:endParaRPr lang="en-IN"/>
           </a:p>
@@ -1293,7 +1293,7 @@
           <a:p>
             <a:fld id="{5C55C9EC-A943-4027-9290-5A7F0DEB51E2}" type="datetimeFigureOut">
               <a:rPr lang="en-US" smtClean="0"/>
-              <a:t>2/11/2023</a:t>
+              <a:t>2/13/2023</a:t>
             </a:fld>
             <a:endParaRPr lang="en-US"/>
           </a:p>
@@ -1491,7 +1491,7 @@
           <a:p>
             <a:fld id="{5C55C9EC-A943-4027-9290-5A7F0DEB51E2}" type="datetimeFigureOut">
               <a:rPr lang="en-US" smtClean="0"/>
-              <a:t>2/11/2023</a:t>
+              <a:t>2/13/2023</a:t>
             </a:fld>
             <a:endParaRPr lang="en-US"/>
           </a:p>
@@ -1766,7 +1766,7 @@
           <a:p>
             <a:fld id="{5C55C9EC-A943-4027-9290-5A7F0DEB51E2}" type="datetimeFigureOut">
               <a:rPr lang="en-US" smtClean="0"/>
-              <a:t>2/11/2023</a:t>
+              <a:t>2/13/2023</a:t>
             </a:fld>
             <a:endParaRPr lang="en-US"/>
           </a:p>
@@ -2031,7 +2031,7 @@
           <a:p>
             <a:fld id="{5C55C9EC-A943-4027-9290-5A7F0DEB51E2}" type="datetimeFigureOut">
               <a:rPr lang="en-US" smtClean="0"/>
-              <a:t>2/11/2023</a:t>
+              <a:t>2/13/2023</a:t>
             </a:fld>
             <a:endParaRPr lang="en-US"/>
           </a:p>
@@ -2443,7 +2443,7 @@
           <a:p>
             <a:fld id="{5C55C9EC-A943-4027-9290-5A7F0DEB51E2}" type="datetimeFigureOut">
               <a:rPr lang="en-US" smtClean="0"/>
-              <a:t>2/11/2023</a:t>
+              <a:t>2/13/2023</a:t>
             </a:fld>
             <a:endParaRPr lang="en-US"/>
           </a:p>
@@ -2584,7 +2584,7 @@
           <a:p>
             <a:fld id="{5C55C9EC-A943-4027-9290-5A7F0DEB51E2}" type="datetimeFigureOut">
               <a:rPr lang="en-US" smtClean="0"/>
-              <a:t>2/11/2023</a:t>
+              <a:t>2/13/2023</a:t>
             </a:fld>
             <a:endParaRPr lang="en-US"/>
           </a:p>
@@ -2697,7 +2697,7 @@
           <a:p>
             <a:fld id="{5C55C9EC-A943-4027-9290-5A7F0DEB51E2}" type="datetimeFigureOut">
               <a:rPr lang="en-US" smtClean="0"/>
-              <a:t>2/11/2023</a:t>
+              <a:t>2/13/2023</a:t>
             </a:fld>
             <a:endParaRPr lang="en-US"/>
           </a:p>
@@ -3008,7 +3008,7 @@
           <a:p>
             <a:fld id="{5C55C9EC-A943-4027-9290-5A7F0DEB51E2}" type="datetimeFigureOut">
               <a:rPr lang="en-US" smtClean="0"/>
-              <a:t>2/11/2023</a:t>
+              <a:t>2/13/2023</a:t>
             </a:fld>
             <a:endParaRPr lang="en-US"/>
           </a:p>
@@ -3208,7 +3208,7 @@
           <a:p>
             <a:fld id="{AAAFDAC1-E73E-4D41-B9D9-D9AB5226AECC}" type="datetimeFigureOut">
               <a:rPr lang="en-IN" smtClean="0"/>
-              <a:t>11-02-2023</a:t>
+              <a:t>13-02-2023</a:t>
             </a:fld>
             <a:endParaRPr lang="en-IN"/>
           </a:p>
@@ -3496,7 +3496,7 @@
           <a:p>
             <a:fld id="{5C55C9EC-A943-4027-9290-5A7F0DEB51E2}" type="datetimeFigureOut">
               <a:rPr lang="en-US" smtClean="0"/>
-              <a:t>2/11/2023</a:t>
+              <a:t>2/13/2023</a:t>
             </a:fld>
             <a:endParaRPr lang="en-US"/>
           </a:p>
@@ -3694,7 +3694,7 @@
           <a:p>
             <a:fld id="{5C55C9EC-A943-4027-9290-5A7F0DEB51E2}" type="datetimeFigureOut">
               <a:rPr lang="en-US" smtClean="0"/>
-              <a:t>2/11/2023</a:t>
+              <a:t>2/13/2023</a:t>
             </a:fld>
             <a:endParaRPr lang="en-US"/>
           </a:p>
@@ -3902,7 +3902,7 @@
           <a:p>
             <a:fld id="{5C55C9EC-A943-4027-9290-5A7F0DEB51E2}" type="datetimeFigureOut">
               <a:rPr lang="en-US" smtClean="0"/>
-              <a:t>2/11/2023</a:t>
+              <a:t>2/13/2023</a:t>
             </a:fld>
             <a:endParaRPr lang="en-US"/>
           </a:p>
@@ -4106,7 +4106,7 @@
           <a:p>
             <a:fld id="{A3D997B0-F87C-48C5-82AE-40756E436AED}" type="datetime1">
               <a:rPr lang="en-US" smtClean="0"/>
-              <a:t>2/11/2023</a:t>
+              <a:t>2/13/2023</a:t>
             </a:fld>
             <a:endParaRPr lang="en-US"/>
           </a:p>
@@ -4279,7 +4279,7 @@
           <a:p>
             <a:fld id="{701D4B01-752C-4C35-AEA2-5921A689F5A7}" type="datetime1">
               <a:rPr lang="en-US" smtClean="0"/>
-              <a:t>2/11/2023</a:t>
+              <a:t>2/13/2023</a:t>
             </a:fld>
             <a:endParaRPr lang="en-US"/>
           </a:p>
@@ -4528,7 +4528,7 @@
           <a:p>
             <a:fld id="{DE74A512-7248-406B-86BF-E296AD55CF49}" type="datetime1">
               <a:rPr lang="en-US" smtClean="0"/>
-              <a:t>2/11/2023</a:t>
+              <a:t>2/13/2023</a:t>
             </a:fld>
             <a:endParaRPr lang="en-US"/>
           </a:p>
@@ -4763,7 +4763,7 @@
           <a:p>
             <a:fld id="{78C537D5-E3DE-4105-B0AC-38A21365C197}" type="datetime1">
               <a:rPr lang="en-US" smtClean="0"/>
-              <a:t>2/11/2023</a:t>
+              <a:t>2/13/2023</a:t>
             </a:fld>
             <a:endParaRPr lang="en-US"/>
           </a:p>
@@ -5133,7 +5133,7 @@
           <a:p>
             <a:fld id="{B8BD058F-09DF-4993-AE53-E92A7689CEAD}" type="datetime1">
               <a:rPr lang="en-US" smtClean="0"/>
-              <a:t>2/11/2023</a:t>
+              <a:t>2/13/2023</a:t>
             </a:fld>
             <a:endParaRPr lang="en-US"/>
           </a:p>
@@ -5254,7 +5254,7 @@
           <a:p>
             <a:fld id="{E19471B3-D8DD-4988-8C26-A807F755DEAD}" type="datetime1">
               <a:rPr lang="en-US" smtClean="0"/>
-              <a:t>2/11/2023</a:t>
+              <a:t>2/13/2023</a:t>
             </a:fld>
             <a:endParaRPr lang="en-US"/>
           </a:p>
@@ -5352,7 +5352,7 @@
           <a:p>
             <a:fld id="{738378E2-22D8-4882-8104-F807B0E62B4E}" type="datetime1">
               <a:rPr lang="en-US" smtClean="0"/>
-              <a:t>2/11/2023</a:t>
+              <a:t>2/13/2023</a:t>
             </a:fld>
             <a:endParaRPr lang="en-US"/>
           </a:p>
@@ -5619,7 +5619,7 @@
           <a:p>
             <a:fld id="{AAAFDAC1-E73E-4D41-B9D9-D9AB5226AECC}" type="datetimeFigureOut">
               <a:rPr lang="en-IN" smtClean="0"/>
-              <a:t>11-02-2023</a:t>
+              <a:t>13-02-2023</a:t>
             </a:fld>
             <a:endParaRPr lang="en-IN"/>
           </a:p>
@@ -5908,7 +5908,7 @@
           <a:p>
             <a:fld id="{A5BAD5AE-3C5E-4251-B769-B6224CE8598B}" type="datetime1">
               <a:rPr lang="en-US" smtClean="0"/>
-              <a:t>2/11/2023</a:t>
+              <a:t>2/13/2023</a:t>
             </a:fld>
             <a:endParaRPr lang="en-US"/>
           </a:p>
@@ -6168,7 +6168,7 @@
           <a:p>
             <a:fld id="{EE312CFE-F8CF-4D2A-A9FF-4F2C30305432}" type="datetime1">
               <a:rPr lang="en-US" smtClean="0"/>
-              <a:t>2/11/2023</a:t>
+              <a:t>2/13/2023</a:t>
             </a:fld>
             <a:endParaRPr lang="en-US"/>
           </a:p>
@@ -6341,7 +6341,7 @@
           <a:p>
             <a:fld id="{C4466C03-75DE-431E-8229-7D31A04DF7BD}" type="datetime1">
               <a:rPr lang="en-US" smtClean="0"/>
-              <a:t>2/11/2023</a:t>
+              <a:t>2/13/2023</a:t>
             </a:fld>
             <a:endParaRPr lang="en-US"/>
           </a:p>
@@ -6524,7 +6524,7 @@
           <a:p>
             <a:fld id="{0D79318F-E85C-4A65-9BDD-82F2415695D3}" type="datetime1">
               <a:rPr lang="en-US" smtClean="0"/>
-              <a:t>2/11/2023</a:t>
+              <a:t>2/13/2023</a:t>
             </a:fld>
             <a:endParaRPr lang="en-US"/>
           </a:p>
@@ -6783,7 +6783,7 @@
           <a:p>
             <a:fld id="{AAAFDAC1-E73E-4D41-B9D9-D9AB5226AECC}" type="datetimeFigureOut">
               <a:rPr lang="en-IN" smtClean="0"/>
-              <a:t>11-02-2023</a:t>
+              <a:t>13-02-2023</a:t>
             </a:fld>
             <a:endParaRPr lang="en-IN"/>
           </a:p>
@@ -7198,7 +7198,7 @@
           <a:p>
             <a:fld id="{AAAFDAC1-E73E-4D41-B9D9-D9AB5226AECC}" type="datetimeFigureOut">
               <a:rPr lang="en-IN" smtClean="0"/>
-              <a:t>11-02-2023</a:t>
+              <a:t>13-02-2023</a:t>
             </a:fld>
             <a:endParaRPr lang="en-IN"/>
           </a:p>
@@ -7340,7 +7340,7 @@
           <a:p>
             <a:fld id="{AAAFDAC1-E73E-4D41-B9D9-D9AB5226AECC}" type="datetimeFigureOut">
               <a:rPr lang="en-IN" smtClean="0"/>
-              <a:t>11-02-2023</a:t>
+              <a:t>13-02-2023</a:t>
             </a:fld>
             <a:endParaRPr lang="en-IN"/>
           </a:p>
@@ -7453,7 +7453,7 @@
           <a:p>
             <a:fld id="{AAAFDAC1-E73E-4D41-B9D9-D9AB5226AECC}" type="datetimeFigureOut">
               <a:rPr lang="en-IN" smtClean="0"/>
-              <a:t>11-02-2023</a:t>
+              <a:t>13-02-2023</a:t>
             </a:fld>
             <a:endParaRPr lang="en-IN"/>
           </a:p>
@@ -7766,7 +7766,7 @@
           <a:p>
             <a:fld id="{AAAFDAC1-E73E-4D41-B9D9-D9AB5226AECC}" type="datetimeFigureOut">
               <a:rPr lang="en-IN" smtClean="0"/>
-              <a:t>11-02-2023</a:t>
+              <a:t>13-02-2023</a:t>
             </a:fld>
             <a:endParaRPr lang="en-IN"/>
           </a:p>
@@ -8055,7 +8055,7 @@
           <a:p>
             <a:fld id="{AAAFDAC1-E73E-4D41-B9D9-D9AB5226AECC}" type="datetimeFigureOut">
               <a:rPr lang="en-IN" smtClean="0"/>
-              <a:t>11-02-2023</a:t>
+              <a:t>13-02-2023</a:t>
             </a:fld>
             <a:endParaRPr lang="en-IN"/>
           </a:p>
@@ -8298,7 +8298,7 @@
           <a:p>
             <a:fld id="{AAAFDAC1-E73E-4D41-B9D9-D9AB5226AECC}" type="datetimeFigureOut">
               <a:rPr lang="en-IN" smtClean="0"/>
-              <a:t>11-02-2023</a:t>
+              <a:t>13-02-2023</a:t>
             </a:fld>
             <a:endParaRPr lang="en-IN"/>
           </a:p>
@@ -8866,7 +8866,7 @@
           <a:p>
             <a:fld id="{5C55C9EC-A943-4027-9290-5A7F0DEB51E2}" type="datetimeFigureOut">
               <a:rPr lang="en-US" smtClean="0"/>
-              <a:t>2/11/2023</a:t>
+              <a:t>2/13/2023</a:t>
             </a:fld>
             <a:endParaRPr lang="en-US"/>
           </a:p>
@@ -9418,7 +9418,7 @@
           <a:p>
             <a:fld id="{3EC3C3A3-B174-4863-A76B-003903AD383A}" type="datetime1">
               <a:rPr lang="en-US" smtClean="0"/>
-              <a:t>2/11/2023</a:t>
+              <a:t>2/13/2023</a:t>
             </a:fld>
             <a:endParaRPr lang="en-US"/>
           </a:p>
@@ -30253,35 +30253,6 @@
           </a:p>
         </p:txBody>
       </p:sp>
-      <p:pic>
-        <p:nvPicPr>
-          <p:cNvPr id="4" name="Picture 3" descr="Graphical user interface, text, application, email&#10;&#10;Description automatically generated">
-            <a:extLst>
-              <a:ext uri="{FF2B5EF4-FFF2-40B4-BE49-F238E27FC236}">
-                <a16:creationId xmlns:a16="http://schemas.microsoft.com/office/drawing/2014/main" id="{A9044A98-8083-B342-4104-9415FF6DD8C1}"/>
-              </a:ext>
-            </a:extLst>
-          </p:cNvPr>
-          <p:cNvPicPr>
-            <a:picLocks noChangeAspect="1"/>
-          </p:cNvPicPr>
-          <p:nvPr/>
-        </p:nvPicPr>
-        <p:blipFill rotWithShape="1">
-          <a:blip r:embed="rId2"/>
-          <a:srcRect r="6649"/>
-          <a:stretch/>
-        </p:blipFill>
-        <p:spPr>
-          <a:xfrm>
-            <a:off x="20" y="1282"/>
-            <a:ext cx="12191980" cy="6856718"/>
-          </a:xfrm>
-          <a:prstGeom prst="rect">
-            <a:avLst/>
-          </a:prstGeom>
-        </p:spPr>
-      </p:pic>
       <p:sp>
         <p:nvSpPr>
           <p:cNvPr id="2" name="Footer Placeholder 1">
@@ -30326,6 +30297,36 @@
           </a:p>
         </p:txBody>
       </p:sp>
+      <p:pic>
+        <p:nvPicPr>
+          <p:cNvPr id="5" name="Picture 4">
+            <a:extLst>
+              <a:ext uri="{FF2B5EF4-FFF2-40B4-BE49-F238E27FC236}">
+                <a16:creationId xmlns:a16="http://schemas.microsoft.com/office/drawing/2014/main" id="{2FEE6F57-03E1-EC0E-891B-E4AD8F2403D4}"/>
+              </a:ext>
+            </a:extLst>
+          </p:cNvPr>
+          <p:cNvPicPr>
+            <a:picLocks noChangeAspect="1"/>
+          </p:cNvPicPr>
+          <p:nvPr/>
+        </p:nvPicPr>
+        <p:blipFill>
+          <a:blip r:embed="rId2"/>
+          <a:stretch>
+            <a:fillRect/>
+          </a:stretch>
+        </p:blipFill>
+        <p:spPr>
+          <a:xfrm>
+            <a:off x="-1" y="0"/>
+            <a:ext cx="12188951" cy="6858000"/>
+          </a:xfrm>
+          <a:prstGeom prst="rect">
+            <a:avLst/>
+          </a:prstGeom>
+        </p:spPr>
+      </p:pic>
     </p:spTree>
     <p:extLst>
       <p:ext uri="{BB962C8B-B14F-4D97-AF65-F5344CB8AC3E}">

</xml_diff>

<commit_message>
Swamy/22feb for 05mar session (#30)
* Update Telemetery.cs

* Update Microservices-Series.MD

* Initial Version

* Documentation Updates

* Update the Documentation

* Section 1 and 2 updated

* Session 4 Documentation

* Documentation Changes
</commit_message>
<xml_diff>
--- a/TechTalk.pptx
+++ b/TechTalk.pptx
@@ -248,7 +248,7 @@
           <a:p>
             <a:fld id="{289D7669-2C4F-4057-B198-13E596C98571}" type="datetimeFigureOut">
               <a:rPr lang="en-IN" smtClean="0"/>
-              <a:t>26-02-2023</a:t>
+              <a:t>11-03-2023</a:t>
             </a:fld>
             <a:endParaRPr lang="en-IN"/>
           </a:p>
@@ -665,7 +665,7 @@
           <a:p>
             <a:fld id="{AAAFDAC1-E73E-4D41-B9D9-D9AB5226AECC}" type="datetimeFigureOut">
               <a:rPr lang="en-IN" smtClean="0"/>
-              <a:t>26-02-2023</a:t>
+              <a:t>11-03-2023</a:t>
             </a:fld>
             <a:endParaRPr lang="en-IN"/>
           </a:p>
@@ -865,7 +865,7 @@
           <a:p>
             <a:fld id="{AAAFDAC1-E73E-4D41-B9D9-D9AB5226AECC}" type="datetimeFigureOut">
               <a:rPr lang="en-IN" smtClean="0"/>
-              <a:t>26-02-2023</a:t>
+              <a:t>11-03-2023</a:t>
             </a:fld>
             <a:endParaRPr lang="en-IN"/>
           </a:p>
@@ -1075,7 +1075,7 @@
           <a:p>
             <a:fld id="{AAAFDAC1-E73E-4D41-B9D9-D9AB5226AECC}" type="datetimeFigureOut">
               <a:rPr lang="en-IN" smtClean="0"/>
-              <a:t>26-02-2023</a:t>
+              <a:t>11-03-2023</a:t>
             </a:fld>
             <a:endParaRPr lang="en-IN"/>
           </a:p>
@@ -1295,7 +1295,7 @@
           <a:p>
             <a:fld id="{5C55C9EC-A943-4027-9290-5A7F0DEB51E2}" type="datetimeFigureOut">
               <a:rPr lang="en-US" smtClean="0"/>
-              <a:t>2/26/2023</a:t>
+              <a:t>3/11/2023</a:t>
             </a:fld>
             <a:endParaRPr lang="en-US"/>
           </a:p>
@@ -1493,7 +1493,7 @@
           <a:p>
             <a:fld id="{5C55C9EC-A943-4027-9290-5A7F0DEB51E2}" type="datetimeFigureOut">
               <a:rPr lang="en-US" smtClean="0"/>
-              <a:t>2/26/2023</a:t>
+              <a:t>3/11/2023</a:t>
             </a:fld>
             <a:endParaRPr lang="en-US"/>
           </a:p>
@@ -1768,7 +1768,7 @@
           <a:p>
             <a:fld id="{5C55C9EC-A943-4027-9290-5A7F0DEB51E2}" type="datetimeFigureOut">
               <a:rPr lang="en-US" smtClean="0"/>
-              <a:t>2/26/2023</a:t>
+              <a:t>3/11/2023</a:t>
             </a:fld>
             <a:endParaRPr lang="en-US"/>
           </a:p>
@@ -2033,7 +2033,7 @@
           <a:p>
             <a:fld id="{5C55C9EC-A943-4027-9290-5A7F0DEB51E2}" type="datetimeFigureOut">
               <a:rPr lang="en-US" smtClean="0"/>
-              <a:t>2/26/2023</a:t>
+              <a:t>3/11/2023</a:t>
             </a:fld>
             <a:endParaRPr lang="en-US"/>
           </a:p>
@@ -2445,7 +2445,7 @@
           <a:p>
             <a:fld id="{5C55C9EC-A943-4027-9290-5A7F0DEB51E2}" type="datetimeFigureOut">
               <a:rPr lang="en-US" smtClean="0"/>
-              <a:t>2/26/2023</a:t>
+              <a:t>3/11/2023</a:t>
             </a:fld>
             <a:endParaRPr lang="en-US"/>
           </a:p>
@@ -2586,7 +2586,7 @@
           <a:p>
             <a:fld id="{5C55C9EC-A943-4027-9290-5A7F0DEB51E2}" type="datetimeFigureOut">
               <a:rPr lang="en-US" smtClean="0"/>
-              <a:t>2/26/2023</a:t>
+              <a:t>3/11/2023</a:t>
             </a:fld>
             <a:endParaRPr lang="en-US"/>
           </a:p>
@@ -2699,7 +2699,7 @@
           <a:p>
             <a:fld id="{5C55C9EC-A943-4027-9290-5A7F0DEB51E2}" type="datetimeFigureOut">
               <a:rPr lang="en-US" smtClean="0"/>
-              <a:t>2/26/2023</a:t>
+              <a:t>3/11/2023</a:t>
             </a:fld>
             <a:endParaRPr lang="en-US"/>
           </a:p>
@@ -3010,7 +3010,7 @@
           <a:p>
             <a:fld id="{5C55C9EC-A943-4027-9290-5A7F0DEB51E2}" type="datetimeFigureOut">
               <a:rPr lang="en-US" smtClean="0"/>
-              <a:t>2/26/2023</a:t>
+              <a:t>3/11/2023</a:t>
             </a:fld>
             <a:endParaRPr lang="en-US"/>
           </a:p>
@@ -3210,7 +3210,7 @@
           <a:p>
             <a:fld id="{AAAFDAC1-E73E-4D41-B9D9-D9AB5226AECC}" type="datetimeFigureOut">
               <a:rPr lang="en-IN" smtClean="0"/>
-              <a:t>26-02-2023</a:t>
+              <a:t>11-03-2023</a:t>
             </a:fld>
             <a:endParaRPr lang="en-IN"/>
           </a:p>
@@ -3498,7 +3498,7 @@
           <a:p>
             <a:fld id="{5C55C9EC-A943-4027-9290-5A7F0DEB51E2}" type="datetimeFigureOut">
               <a:rPr lang="en-US" smtClean="0"/>
-              <a:t>2/26/2023</a:t>
+              <a:t>3/11/2023</a:t>
             </a:fld>
             <a:endParaRPr lang="en-US"/>
           </a:p>
@@ -3696,7 +3696,7 @@
           <a:p>
             <a:fld id="{5C55C9EC-A943-4027-9290-5A7F0DEB51E2}" type="datetimeFigureOut">
               <a:rPr lang="en-US" smtClean="0"/>
-              <a:t>2/26/2023</a:t>
+              <a:t>3/11/2023</a:t>
             </a:fld>
             <a:endParaRPr lang="en-US"/>
           </a:p>
@@ -3904,7 +3904,7 @@
           <a:p>
             <a:fld id="{5C55C9EC-A943-4027-9290-5A7F0DEB51E2}" type="datetimeFigureOut">
               <a:rPr lang="en-US" smtClean="0"/>
-              <a:t>2/26/2023</a:t>
+              <a:t>3/11/2023</a:t>
             </a:fld>
             <a:endParaRPr lang="en-US"/>
           </a:p>
@@ -4108,7 +4108,7 @@
           <a:p>
             <a:fld id="{A3D997B0-F87C-48C5-82AE-40756E436AED}" type="datetime1">
               <a:rPr lang="en-US" smtClean="0"/>
-              <a:t>2/26/2023</a:t>
+              <a:t>3/11/2023</a:t>
             </a:fld>
             <a:endParaRPr lang="en-US"/>
           </a:p>
@@ -4281,7 +4281,7 @@
           <a:p>
             <a:fld id="{701D4B01-752C-4C35-AEA2-5921A689F5A7}" type="datetime1">
               <a:rPr lang="en-US" smtClean="0"/>
-              <a:t>2/26/2023</a:t>
+              <a:t>3/11/2023</a:t>
             </a:fld>
             <a:endParaRPr lang="en-US"/>
           </a:p>
@@ -4530,7 +4530,7 @@
           <a:p>
             <a:fld id="{DE74A512-7248-406B-86BF-E296AD55CF49}" type="datetime1">
               <a:rPr lang="en-US" smtClean="0"/>
-              <a:t>2/26/2023</a:t>
+              <a:t>3/11/2023</a:t>
             </a:fld>
             <a:endParaRPr lang="en-US"/>
           </a:p>
@@ -4765,7 +4765,7 @@
           <a:p>
             <a:fld id="{78C537D5-E3DE-4105-B0AC-38A21365C197}" type="datetime1">
               <a:rPr lang="en-US" smtClean="0"/>
-              <a:t>2/26/2023</a:t>
+              <a:t>3/11/2023</a:t>
             </a:fld>
             <a:endParaRPr lang="en-US"/>
           </a:p>
@@ -5135,7 +5135,7 @@
           <a:p>
             <a:fld id="{B8BD058F-09DF-4993-AE53-E92A7689CEAD}" type="datetime1">
               <a:rPr lang="en-US" smtClean="0"/>
-              <a:t>2/26/2023</a:t>
+              <a:t>3/11/2023</a:t>
             </a:fld>
             <a:endParaRPr lang="en-US"/>
           </a:p>
@@ -5256,7 +5256,7 @@
           <a:p>
             <a:fld id="{E19471B3-D8DD-4988-8C26-A807F755DEAD}" type="datetime1">
               <a:rPr lang="en-US" smtClean="0"/>
-              <a:t>2/26/2023</a:t>
+              <a:t>3/11/2023</a:t>
             </a:fld>
             <a:endParaRPr lang="en-US"/>
           </a:p>
@@ -5354,7 +5354,7 @@
           <a:p>
             <a:fld id="{738378E2-22D8-4882-8104-F807B0E62B4E}" type="datetime1">
               <a:rPr lang="en-US" smtClean="0"/>
-              <a:t>2/26/2023</a:t>
+              <a:t>3/11/2023</a:t>
             </a:fld>
             <a:endParaRPr lang="en-US"/>
           </a:p>
@@ -5621,7 +5621,7 @@
           <a:p>
             <a:fld id="{AAAFDAC1-E73E-4D41-B9D9-D9AB5226AECC}" type="datetimeFigureOut">
               <a:rPr lang="en-IN" smtClean="0"/>
-              <a:t>26-02-2023</a:t>
+              <a:t>11-03-2023</a:t>
             </a:fld>
             <a:endParaRPr lang="en-IN"/>
           </a:p>
@@ -5910,7 +5910,7 @@
           <a:p>
             <a:fld id="{A5BAD5AE-3C5E-4251-B769-B6224CE8598B}" type="datetime1">
               <a:rPr lang="en-US" smtClean="0"/>
-              <a:t>2/26/2023</a:t>
+              <a:t>3/11/2023</a:t>
             </a:fld>
             <a:endParaRPr lang="en-US"/>
           </a:p>
@@ -6170,7 +6170,7 @@
           <a:p>
             <a:fld id="{EE312CFE-F8CF-4D2A-A9FF-4F2C30305432}" type="datetime1">
               <a:rPr lang="en-US" smtClean="0"/>
-              <a:t>2/26/2023</a:t>
+              <a:t>3/11/2023</a:t>
             </a:fld>
             <a:endParaRPr lang="en-US"/>
           </a:p>
@@ -6343,7 +6343,7 @@
           <a:p>
             <a:fld id="{C4466C03-75DE-431E-8229-7D31A04DF7BD}" type="datetime1">
               <a:rPr lang="en-US" smtClean="0"/>
-              <a:t>2/26/2023</a:t>
+              <a:t>3/11/2023</a:t>
             </a:fld>
             <a:endParaRPr lang="en-US"/>
           </a:p>
@@ -6526,7 +6526,7 @@
           <a:p>
             <a:fld id="{0D79318F-E85C-4A65-9BDD-82F2415695D3}" type="datetime1">
               <a:rPr lang="en-US" smtClean="0"/>
-              <a:t>2/26/2023</a:t>
+              <a:t>3/11/2023</a:t>
             </a:fld>
             <a:endParaRPr lang="en-US"/>
           </a:p>
@@ -6785,7 +6785,7 @@
           <a:p>
             <a:fld id="{AAAFDAC1-E73E-4D41-B9D9-D9AB5226AECC}" type="datetimeFigureOut">
               <a:rPr lang="en-IN" smtClean="0"/>
-              <a:t>26-02-2023</a:t>
+              <a:t>11-03-2023</a:t>
             </a:fld>
             <a:endParaRPr lang="en-IN"/>
           </a:p>
@@ -7200,7 +7200,7 @@
           <a:p>
             <a:fld id="{AAAFDAC1-E73E-4D41-B9D9-D9AB5226AECC}" type="datetimeFigureOut">
               <a:rPr lang="en-IN" smtClean="0"/>
-              <a:t>26-02-2023</a:t>
+              <a:t>11-03-2023</a:t>
             </a:fld>
             <a:endParaRPr lang="en-IN"/>
           </a:p>
@@ -7342,7 +7342,7 @@
           <a:p>
             <a:fld id="{AAAFDAC1-E73E-4D41-B9D9-D9AB5226AECC}" type="datetimeFigureOut">
               <a:rPr lang="en-IN" smtClean="0"/>
-              <a:t>26-02-2023</a:t>
+              <a:t>11-03-2023</a:t>
             </a:fld>
             <a:endParaRPr lang="en-IN"/>
           </a:p>
@@ -7455,7 +7455,7 @@
           <a:p>
             <a:fld id="{AAAFDAC1-E73E-4D41-B9D9-D9AB5226AECC}" type="datetimeFigureOut">
               <a:rPr lang="en-IN" smtClean="0"/>
-              <a:t>26-02-2023</a:t>
+              <a:t>11-03-2023</a:t>
             </a:fld>
             <a:endParaRPr lang="en-IN"/>
           </a:p>
@@ -7768,7 +7768,7 @@
           <a:p>
             <a:fld id="{AAAFDAC1-E73E-4D41-B9D9-D9AB5226AECC}" type="datetimeFigureOut">
               <a:rPr lang="en-IN" smtClean="0"/>
-              <a:t>26-02-2023</a:t>
+              <a:t>11-03-2023</a:t>
             </a:fld>
             <a:endParaRPr lang="en-IN"/>
           </a:p>
@@ -8057,7 +8057,7 @@
           <a:p>
             <a:fld id="{AAAFDAC1-E73E-4D41-B9D9-D9AB5226AECC}" type="datetimeFigureOut">
               <a:rPr lang="en-IN" smtClean="0"/>
-              <a:t>26-02-2023</a:t>
+              <a:t>11-03-2023</a:t>
             </a:fld>
             <a:endParaRPr lang="en-IN"/>
           </a:p>
@@ -8300,7 +8300,7 @@
           <a:p>
             <a:fld id="{AAAFDAC1-E73E-4D41-B9D9-D9AB5226AECC}" type="datetimeFigureOut">
               <a:rPr lang="en-IN" smtClean="0"/>
-              <a:t>26-02-2023</a:t>
+              <a:t>11-03-2023</a:t>
             </a:fld>
             <a:endParaRPr lang="en-IN"/>
           </a:p>
@@ -8868,7 +8868,7 @@
           <a:p>
             <a:fld id="{5C55C9EC-A943-4027-9290-5A7F0DEB51E2}" type="datetimeFigureOut">
               <a:rPr lang="en-US" smtClean="0"/>
-              <a:t>2/26/2023</a:t>
+              <a:t>3/11/2023</a:t>
             </a:fld>
             <a:endParaRPr lang="en-US"/>
           </a:p>
@@ -9420,7 +9420,7 @@
           <a:p>
             <a:fld id="{3EC3C3A3-B174-4863-A76B-003903AD383A}" type="datetime1">
               <a:rPr lang="en-US" smtClean="0"/>
-              <a:t>2/26/2023</a:t>
+              <a:t>3/11/2023</a:t>
             </a:fld>
             <a:endParaRPr lang="en-US"/>
           </a:p>
@@ -26686,7 +26686,7 @@
                 <a:ea typeface="+mn-ea"/>
                 <a:cs typeface="+mn-cs"/>
               </a:rPr>
-              <a:t>Sunday, Mar 05, 2023</a:t>
+              <a:t>Sunday, Mar 12, 2023</a:t>
             </a:r>
             <a:endParaRPr kumimoji="0" lang="en-IN" sz="2000" b="0" i="0" u="none" strike="noStrike" kern="1200" cap="none" spc="0" normalizeH="0" baseline="0" noProof="0" dirty="0">
               <a:ln>

</xml_diff>